<commit_message>
Add quality trimming and QC on input data
</commit_message>
<xml_diff>
--- a/docs/process.schematic.pptx
+++ b/docs/process.schematic.pptx
@@ -3460,7 +3460,7 @@
           <a:p>
             <a:r>
               <a:rPr lang="en-US" dirty="0"/>
-              <a:t>6. Generate double-strand consensus (DSC)</a:t>
+              <a:t>7. Generate double-strand consensus (DSC)</a:t>
             </a:r>
           </a:p>
         </p:txBody>
@@ -3860,7 +3860,7 @@
           <a:p>
             <a:r>
               <a:rPr lang="en-US" dirty="0"/>
-              <a:t>7. Identify genomic variants</a:t>
+              <a:t>8. Identify genomic variants</a:t>
             </a:r>
           </a:p>
         </p:txBody>

</xml_diff>